<commit_message>
Extra slides voor algemene opbouw presentatie
</commit_message>
<xml_diff>
--- a/doc/module3_Presentatie.pptx
+++ b/doc/module3_Presentatie.pptx
@@ -9,6 +9,9 @@
     <p:sldId id="257" r:id="rId3"/>
     <p:sldId id="258" r:id="rId4"/>
     <p:sldId id="259" r:id="rId5"/>
+    <p:sldId id="260" r:id="rId6"/>
+    <p:sldId id="262" r:id="rId7"/>
+    <p:sldId id="261" r:id="rId8"/>
   </p:sldIdLst>
   <p:sldSz cx="12192000" cy="6858000"/>
   <p:notesSz cx="6858000" cy="9144000"/>
@@ -107,6 +110,11 @@
       </a:defRPr>
     </a:lvl9pPr>
   </p:defaultTextStyle>
+  <p:extLst>
+    <p:ext uri="{EFAFB233-063F-42B5-8137-9DF3F51BA10A}">
+      <p15:sldGuideLst xmlns:p15="http://schemas.microsoft.com/office/powerpoint/2012/main"/>
+    </p:ext>
+  </p:extLst>
 </p:presentation>
 </file>
 
@@ -155,7 +163,6 @@
               <a:rPr lang="nl-NL"/>
               <a:t>Klik om de stijl te bewerken</a:t>
             </a:r>
-            <a:endParaRPr lang="nl-NL"/>
           </a:p>
         </p:txBody>
       </p:sp>
@@ -220,7 +227,6 @@
               <a:rPr lang="nl-NL"/>
               <a:t>Klik om de ondertitelstijl van het model te bewerken</a:t>
             </a:r>
-            <a:endParaRPr lang="nl-NL"/>
           </a:p>
         </p:txBody>
       </p:sp>
@@ -338,7 +344,6 @@
               <a:rPr lang="nl-NL"/>
               <a:t>Klik om de stijl te bewerken</a:t>
             </a:r>
-            <a:endParaRPr lang="nl-NL"/>
           </a:p>
         </p:txBody>
       </p:sp>
@@ -390,7 +395,6 @@
               <a:rPr lang="nl-NL"/>
               <a:t>Vijfde niveau</a:t>
             </a:r>
-            <a:endParaRPr lang="nl-NL"/>
           </a:p>
         </p:txBody>
       </p:sp>
@@ -513,7 +517,6 @@
               <a:rPr lang="nl-NL"/>
               <a:t>Klik om de stijl te bewerken</a:t>
             </a:r>
-            <a:endParaRPr lang="nl-NL"/>
           </a:p>
         </p:txBody>
       </p:sp>
@@ -570,7 +573,6 @@
               <a:rPr lang="nl-NL"/>
               <a:t>Vijfde niveau</a:t>
             </a:r>
-            <a:endParaRPr lang="nl-NL"/>
           </a:p>
         </p:txBody>
       </p:sp>
@@ -688,7 +690,6 @@
               <a:rPr lang="nl-NL"/>
               <a:t>Klik om de stijl te bewerken</a:t>
             </a:r>
-            <a:endParaRPr lang="nl-NL"/>
           </a:p>
         </p:txBody>
       </p:sp>
@@ -740,7 +741,6 @@
               <a:rPr lang="nl-NL"/>
               <a:t>Vijfde niveau</a:t>
             </a:r>
-            <a:endParaRPr lang="nl-NL"/>
           </a:p>
         </p:txBody>
       </p:sp>
@@ -867,7 +867,6 @@
               <a:rPr lang="nl-NL"/>
               <a:t>Klik om de stijl te bewerken</a:t>
             </a:r>
-            <a:endParaRPr lang="nl-NL"/>
           </a:p>
         </p:txBody>
       </p:sp>
@@ -1104,7 +1103,6 @@
               <a:rPr lang="nl-NL"/>
               <a:t>Klik om de stijl te bewerken</a:t>
             </a:r>
-            <a:endParaRPr lang="nl-NL"/>
           </a:p>
         </p:txBody>
       </p:sp>
@@ -1161,7 +1159,6 @@
               <a:rPr lang="nl-NL"/>
               <a:t>Vijfde niveau</a:t>
             </a:r>
-            <a:endParaRPr lang="nl-NL"/>
           </a:p>
         </p:txBody>
       </p:sp>
@@ -1218,7 +1215,6 @@
               <a:rPr lang="nl-NL"/>
               <a:t>Vijfde niveau</a:t>
             </a:r>
-            <a:endParaRPr lang="nl-NL"/>
           </a:p>
         </p:txBody>
       </p:sp>
@@ -1341,7 +1337,6 @@
               <a:rPr lang="nl-NL"/>
               <a:t>Klik om de stijl te bewerken</a:t>
             </a:r>
-            <a:endParaRPr lang="nl-NL"/>
           </a:p>
         </p:txBody>
       </p:sp>
@@ -1463,7 +1458,6 @@
               <a:rPr lang="nl-NL"/>
               <a:t>Vijfde niveau</a:t>
             </a:r>
-            <a:endParaRPr lang="nl-NL"/>
           </a:p>
         </p:txBody>
       </p:sp>
@@ -1585,7 +1579,6 @@
               <a:rPr lang="nl-NL"/>
               <a:t>Vijfde niveau</a:t>
             </a:r>
-            <a:endParaRPr lang="nl-NL"/>
           </a:p>
         </p:txBody>
       </p:sp>
@@ -1703,7 +1696,6 @@
               <a:rPr lang="nl-NL"/>
               <a:t>Klik om de stijl te bewerken</a:t>
             </a:r>
-            <a:endParaRPr lang="nl-NL"/>
           </a:p>
         </p:txBody>
       </p:sp>
@@ -1925,7 +1917,6 @@
               <a:rPr lang="nl-NL"/>
               <a:t>Klik om de stijl te bewerken</a:t>
             </a:r>
-            <a:endParaRPr lang="nl-NL"/>
           </a:p>
         </p:txBody>
       </p:sp>
@@ -2010,7 +2001,6 @@
               <a:rPr lang="nl-NL"/>
               <a:t>Vijfde niveau</a:t>
             </a:r>
-            <a:endParaRPr lang="nl-NL"/>
           </a:p>
         </p:txBody>
       </p:sp>
@@ -2202,7 +2192,6 @@
               <a:rPr lang="nl-NL"/>
               <a:t>Klik om de stijl te bewerken</a:t>
             </a:r>
-            <a:endParaRPr lang="nl-NL"/>
           </a:p>
         </p:txBody>
       </p:sp>
@@ -2461,7 +2450,6 @@
               <a:rPr lang="nl-NL"/>
               <a:t>Klik om de stijl te bewerken</a:t>
             </a:r>
-            <a:endParaRPr lang="nl-NL"/>
           </a:p>
         </p:txBody>
       </p:sp>
@@ -2523,7 +2511,6 @@
               <a:rPr lang="nl-NL"/>
               <a:t>Vijfde niveau</a:t>
             </a:r>
-            <a:endParaRPr lang="nl-NL"/>
           </a:p>
         </p:txBody>
       </p:sp>
@@ -3314,6 +3301,219 @@
 </p:sld>
 </file>
 
+<file path=ppt/slides/slide5.xml><?xml version="1.0" encoding="utf-8"?>
+<p:sld xmlns:a="http://schemas.openxmlformats.org/drawingml/2006/main" xmlns:r="http://schemas.openxmlformats.org/officeDocument/2006/relationships" xmlns:p="http://schemas.openxmlformats.org/presentationml/2006/main">
+  <p:cSld>
+    <p:spTree>
+      <p:nvGrpSpPr>
+        <p:cNvPr id="1" name=""/>
+        <p:cNvGrpSpPr/>
+        <p:nvPr/>
+      </p:nvGrpSpPr>
+      <p:grpSpPr>
+        <a:xfrm>
+          <a:off x="0" y="0"/>
+          <a:ext cx="0" cy="0"/>
+          <a:chOff x="0" y="0"/>
+          <a:chExt cx="0" cy="0"/>
+        </a:xfrm>
+      </p:grpSpPr>
+      <p:sp>
+        <p:nvSpPr>
+          <p:cNvPr id="2" name="Titel 1"/>
+          <p:cNvSpPr>
+            <a:spLocks noGrp="1"/>
+          </p:cNvSpPr>
+          <p:nvPr>
+            <p:ph type="title"/>
+          </p:nvPr>
+        </p:nvSpPr>
+        <p:spPr/>
+        <p:txBody>
+          <a:bodyPr/>
+          <a:lstStyle/>
+          <a:p>
+            <a:r>
+              <a:rPr lang="nl-NL" dirty="0"/>
+              <a:t>Hardware</a:t>
+            </a:r>
+          </a:p>
+        </p:txBody>
+      </p:sp>
+      <p:sp>
+        <p:nvSpPr>
+          <p:cNvPr id="3" name="Tijdelijke aanduiding voor inhoud 2"/>
+          <p:cNvSpPr>
+            <a:spLocks noGrp="1"/>
+          </p:cNvSpPr>
+          <p:nvPr>
+            <p:ph idx="1"/>
+          </p:nvPr>
+        </p:nvSpPr>
+        <p:spPr/>
+        <p:txBody>
+          <a:bodyPr/>
+          <a:lstStyle/>
+          <a:p>
+            <a:endParaRPr lang="nl-NL"/>
+          </a:p>
+        </p:txBody>
+      </p:sp>
+    </p:spTree>
+    <p:extLst>
+      <p:ext uri="{BB962C8B-B14F-4D97-AF65-F5344CB8AC3E}">
+        <p14:creationId xmlns:p14="http://schemas.microsoft.com/office/powerpoint/2010/main" val="2975633478"/>
+      </p:ext>
+    </p:extLst>
+  </p:cSld>
+  <p:clrMapOvr>
+    <a:masterClrMapping/>
+  </p:clrMapOvr>
+</p:sld>
+</file>
+
+<file path=ppt/slides/slide6.xml><?xml version="1.0" encoding="utf-8"?>
+<p:sld xmlns:a="http://schemas.openxmlformats.org/drawingml/2006/main" xmlns:r="http://schemas.openxmlformats.org/officeDocument/2006/relationships" xmlns:p="http://schemas.openxmlformats.org/presentationml/2006/main">
+  <p:cSld>
+    <p:spTree>
+      <p:nvGrpSpPr>
+        <p:cNvPr id="1" name=""/>
+        <p:cNvGrpSpPr/>
+        <p:nvPr/>
+      </p:nvGrpSpPr>
+      <p:grpSpPr>
+        <a:xfrm>
+          <a:off x="0" y="0"/>
+          <a:ext cx="0" cy="0"/>
+          <a:chOff x="0" y="0"/>
+          <a:chExt cx="0" cy="0"/>
+        </a:xfrm>
+      </p:grpSpPr>
+      <p:sp>
+        <p:nvSpPr>
+          <p:cNvPr id="2" name="Titel 1"/>
+          <p:cNvSpPr>
+            <a:spLocks noGrp="1"/>
+          </p:cNvSpPr>
+          <p:nvPr>
+            <p:ph type="title"/>
+          </p:nvPr>
+        </p:nvSpPr>
+        <p:spPr/>
+        <p:txBody>
+          <a:bodyPr/>
+          <a:lstStyle/>
+          <a:p>
+            <a:r>
+              <a:rPr lang="nl-NL" dirty="0"/>
+              <a:t>Toekomstplannen</a:t>
+            </a:r>
+          </a:p>
+        </p:txBody>
+      </p:sp>
+      <p:sp>
+        <p:nvSpPr>
+          <p:cNvPr id="3" name="Tijdelijke aanduiding voor inhoud 2"/>
+          <p:cNvSpPr>
+            <a:spLocks noGrp="1"/>
+          </p:cNvSpPr>
+          <p:nvPr>
+            <p:ph idx="1"/>
+          </p:nvPr>
+        </p:nvSpPr>
+        <p:spPr/>
+        <p:txBody>
+          <a:bodyPr/>
+          <a:lstStyle/>
+          <a:p>
+            <a:endParaRPr lang="nl-NL"/>
+          </a:p>
+        </p:txBody>
+      </p:sp>
+    </p:spTree>
+    <p:extLst>
+      <p:ext uri="{BB962C8B-B14F-4D97-AF65-F5344CB8AC3E}">
+        <p14:creationId xmlns:p14="http://schemas.microsoft.com/office/powerpoint/2010/main" val="367848951"/>
+      </p:ext>
+    </p:extLst>
+  </p:cSld>
+  <p:clrMapOvr>
+    <a:masterClrMapping/>
+  </p:clrMapOvr>
+</p:sld>
+</file>
+
+<file path=ppt/slides/slide7.xml><?xml version="1.0" encoding="utf-8"?>
+<p:sld xmlns:a="http://schemas.openxmlformats.org/drawingml/2006/main" xmlns:r="http://schemas.openxmlformats.org/officeDocument/2006/relationships" xmlns:p="http://schemas.openxmlformats.org/presentationml/2006/main">
+  <p:cSld>
+    <p:spTree>
+      <p:nvGrpSpPr>
+        <p:cNvPr id="1" name=""/>
+        <p:cNvGrpSpPr/>
+        <p:nvPr/>
+      </p:nvGrpSpPr>
+      <p:grpSpPr>
+        <a:xfrm>
+          <a:off x="0" y="0"/>
+          <a:ext cx="0" cy="0"/>
+          <a:chOff x="0" y="0"/>
+          <a:chExt cx="0" cy="0"/>
+        </a:xfrm>
+      </p:grpSpPr>
+      <p:sp>
+        <p:nvSpPr>
+          <p:cNvPr id="2" name="Titel 1"/>
+          <p:cNvSpPr>
+            <a:spLocks noGrp="1"/>
+          </p:cNvSpPr>
+          <p:nvPr>
+            <p:ph type="title"/>
+          </p:nvPr>
+        </p:nvSpPr>
+        <p:spPr/>
+        <p:txBody>
+          <a:bodyPr/>
+          <a:lstStyle/>
+          <a:p>
+            <a:r>
+              <a:rPr lang="nl-NL" dirty="0"/>
+              <a:t>Afsluiting</a:t>
+            </a:r>
+          </a:p>
+        </p:txBody>
+      </p:sp>
+      <p:sp>
+        <p:nvSpPr>
+          <p:cNvPr id="3" name="Tijdelijke aanduiding voor inhoud 2"/>
+          <p:cNvSpPr>
+            <a:spLocks noGrp="1"/>
+          </p:cNvSpPr>
+          <p:nvPr>
+            <p:ph idx="1"/>
+          </p:nvPr>
+        </p:nvSpPr>
+        <p:spPr/>
+        <p:txBody>
+          <a:bodyPr/>
+          <a:lstStyle/>
+          <a:p>
+            <a:endParaRPr lang="nl-NL"/>
+          </a:p>
+        </p:txBody>
+      </p:sp>
+    </p:spTree>
+    <p:extLst>
+      <p:ext uri="{BB962C8B-B14F-4D97-AF65-F5344CB8AC3E}">
+        <p14:creationId xmlns:p14="http://schemas.microsoft.com/office/powerpoint/2010/main" val="2617248755"/>
+      </p:ext>
+    </p:extLst>
+  </p:cSld>
+  <p:clrMapOvr>
+    <a:masterClrMapping/>
+  </p:clrMapOvr>
+</p:sld>
+</file>
+
 <file path=ppt/theme/theme1.xml><?xml version="1.0" encoding="utf-8"?>
 <a:theme xmlns:a="http://schemas.openxmlformats.org/drawingml/2006/main" name="Kantoorthema">
   <a:themeElements>

</xml_diff>

<commit_message>
Completed my part with corresponding images. Got my text of what to say for my part in my head so that's not included ;).
</commit_message>
<xml_diff>
--- a/doc/module3_Presentatie.pptx
+++ b/doc/module3_Presentatie.pptx
@@ -3111,20 +3111,43 @@
           </a:p>
           <a:p>
             <a:r>
+              <a:rPr lang="nl-NL" dirty="0" err="1"/>
+              <a:t>Zordon</a:t>
+            </a:r>
+            <a:r>
               <a:rPr lang="nl-NL" dirty="0"/>
-              <a:t>Software </a:t>
-            </a:r>
-          </a:p>
-          <a:p>
+              <a:t> Software </a:t>
+            </a:r>
+          </a:p>
+          <a:p>
+            <a:r>
+              <a:rPr lang="nl-NL" dirty="0" err="1"/>
+              <a:t>Zordon</a:t>
+            </a:r>
             <a:r>
               <a:rPr lang="nl-NL" dirty="0"/>
-              <a:t>Hardware</a:t>
+              <a:t> Hardware</a:t>
             </a:r>
           </a:p>
           <a:p>
             <a:r>
               <a:rPr lang="nl-NL" dirty="0"/>
-              <a:t>Afsluiting</a:t>
+              <a:t>Toekomstplannen voor </a:t>
+            </a:r>
+            <a:r>
+              <a:rPr lang="nl-NL" dirty="0" err="1"/>
+              <a:t>Zordon</a:t>
+            </a:r>
+            <a:endParaRPr lang="nl-NL" dirty="0"/>
+          </a:p>
+          <a:p>
+            <a:r>
+              <a:rPr lang="nl-NL" dirty="0" err="1"/>
+              <a:t>Zordon</a:t>
+            </a:r>
+            <a:r>
+              <a:rPr lang="nl-NL" dirty="0"/>
+              <a:t> Afsluiting</a:t>
             </a:r>
           </a:p>
           <a:p>
@@ -3177,6 +3200,7 @@
           <a:bodyPr/>
           <a:lstStyle/>
           <a:p>
+            <a:pPr algn="ctr"/>
             <a:r>
               <a:rPr lang="nl-NL" dirty="0" err="1"/>
               <a:t>Zordon</a:t>
@@ -3213,8 +3237,68 @@
         <p:spPr>
           <a:xfrm>
             <a:off x="349695" y="1690688"/>
-            <a:ext cx="5590061" cy="2305240"/>
+            <a:ext cx="4789233" cy="2305240"/>
           </a:xfrm>
+        </p:spPr>
+      </p:pic>
+      <p:pic>
+        <p:nvPicPr>
+          <p:cNvPr id="3" name="Afbeelding 2"/>
+          <p:cNvPicPr>
+            <a:picLocks noChangeAspect="1"/>
+          </p:cNvPicPr>
+          <p:nvPr/>
+        </p:nvPicPr>
+        <p:blipFill>
+          <a:blip r:embed="rId3">
+            <a:extLst>
+              <a:ext uri="{28A0092B-C50C-407E-A947-70E740481C1C}">
+                <a14:useLocalDpi xmlns:a14="http://schemas.microsoft.com/office/drawing/2010/main" val="0"/>
+              </a:ext>
+            </a:extLst>
+          </a:blip>
+          <a:stretch>
+            <a:fillRect/>
+          </a:stretch>
+        </p:blipFill>
+        <p:spPr>
+          <a:xfrm>
+            <a:off x="7692334" y="1690688"/>
+            <a:ext cx="2756210" cy="4593683"/>
+          </a:xfrm>
+          <a:prstGeom prst="rect">
+            <a:avLst/>
+          </a:prstGeom>
+        </p:spPr>
+      </p:pic>
+      <p:pic>
+        <p:nvPicPr>
+          <p:cNvPr id="5" name="Afbeelding 4"/>
+          <p:cNvPicPr>
+            <a:picLocks noChangeAspect="1"/>
+          </p:cNvPicPr>
+          <p:nvPr/>
+        </p:nvPicPr>
+        <p:blipFill>
+          <a:blip r:embed="rId4">
+            <a:extLst>
+              <a:ext uri="{28A0092B-C50C-407E-A947-70E740481C1C}">
+                <a14:useLocalDpi xmlns:a14="http://schemas.microsoft.com/office/drawing/2010/main" val="0"/>
+              </a:ext>
+            </a:extLst>
+          </a:blip>
+          <a:stretch>
+            <a:fillRect/>
+          </a:stretch>
+        </p:blipFill>
+        <p:spPr>
+          <a:xfrm>
+            <a:off x="5349760" y="2707888"/>
+            <a:ext cx="2131741" cy="2131741"/>
+          </a:xfrm>
+          <a:prstGeom prst="rect">
+            <a:avLst/>
+          </a:prstGeom>
         </p:spPr>
       </p:pic>
     </p:spTree>
@@ -3263,8 +3347,12 @@
           <a:lstStyle/>
           <a:p>
             <a:r>
+              <a:rPr lang="nl-NL" dirty="0" err="1"/>
+              <a:t>Zordon</a:t>
+            </a:r>
+            <a:r>
               <a:rPr lang="nl-NL" dirty="0"/>
-              <a:t>Software</a:t>
+              <a:t> Software</a:t>
             </a:r>
           </a:p>
         </p:txBody>
@@ -3334,8 +3422,12 @@
           <a:lstStyle/>
           <a:p>
             <a:r>
+              <a:rPr lang="nl-NL" dirty="0" err="1"/>
+              <a:t>Zordon</a:t>
+            </a:r>
+            <a:r>
               <a:rPr lang="nl-NL" dirty="0"/>
-              <a:t>Hardware</a:t>
+              <a:t> Hardware</a:t>
             </a:r>
           </a:p>
         </p:txBody>
@@ -3406,8 +3498,13 @@
           <a:p>
             <a:r>
               <a:rPr lang="nl-NL" dirty="0"/>
-              <a:t>Toekomstplannen</a:t>
-            </a:r>
+              <a:t>Toekomstplannen voor </a:t>
+            </a:r>
+            <a:r>
+              <a:rPr lang="nl-NL" dirty="0" err="1"/>
+              <a:t>Zordon</a:t>
+            </a:r>
+            <a:endParaRPr lang="nl-NL" dirty="0"/>
           </a:p>
         </p:txBody>
       </p:sp>
@@ -3476,8 +3573,12 @@
           <a:lstStyle/>
           <a:p>
             <a:r>
+              <a:rPr lang="nl-NL" dirty="0" err="1"/>
+              <a:t>Zordon</a:t>
+            </a:r>
+            <a:r>
               <a:rPr lang="nl-NL" dirty="0"/>
-              <a:t>Afsluiting</a:t>
+              <a:t> Afsluiting</a:t>
             </a:r>
           </a:p>
         </p:txBody>

</xml_diff>

<commit_message>
Software deel presentatie toegevoegd
</commit_message>
<xml_diff>
--- a/doc/module3_Presentatie.pptx
+++ b/doc/module3_Presentatie.pptx
@@ -4,12 +4,15 @@
   <p:sldMasterIdLst>
     <p:sldMasterId id="2147483648" r:id="rId1"/>
   </p:sldMasterIdLst>
+  <p:notesMasterIdLst>
+    <p:notesMasterId r:id="rId9"/>
+  </p:notesMasterIdLst>
   <p:sldIdLst>
     <p:sldId id="256" r:id="rId2"/>
     <p:sldId id="257" r:id="rId3"/>
     <p:sldId id="258" r:id="rId4"/>
-    <p:sldId id="259" r:id="rId5"/>
-    <p:sldId id="260" r:id="rId6"/>
+    <p:sldId id="260" r:id="rId5"/>
+    <p:sldId id="259" r:id="rId6"/>
     <p:sldId id="262" r:id="rId7"/>
     <p:sldId id="261" r:id="rId8"/>
   </p:sldIdLst>
@@ -118,6 +121,738 @@
 </p:presentation>
 </file>
 
+<file path=ppt/notesMasters/notesMaster1.xml><?xml version="1.0" encoding="utf-8"?>
+<p:notesMaster xmlns:a="http://schemas.openxmlformats.org/drawingml/2006/main" xmlns:r="http://schemas.openxmlformats.org/officeDocument/2006/relationships" xmlns:p="http://schemas.openxmlformats.org/presentationml/2006/main">
+  <p:cSld>
+    <p:bg>
+      <p:bgRef idx="1001">
+        <a:schemeClr val="bg1"/>
+      </p:bgRef>
+    </p:bg>
+    <p:spTree>
+      <p:nvGrpSpPr>
+        <p:cNvPr id="1" name=""/>
+        <p:cNvGrpSpPr/>
+        <p:nvPr/>
+      </p:nvGrpSpPr>
+      <p:grpSpPr>
+        <a:xfrm>
+          <a:off x="0" y="0"/>
+          <a:ext cx="0" cy="0"/>
+          <a:chOff x="0" y="0"/>
+          <a:chExt cx="0" cy="0"/>
+        </a:xfrm>
+      </p:grpSpPr>
+      <p:sp>
+        <p:nvSpPr>
+          <p:cNvPr id="2" name="Tijdelijke aanduiding voor koptekst 1"/>
+          <p:cNvSpPr>
+            <a:spLocks noGrp="1"/>
+          </p:cNvSpPr>
+          <p:nvPr>
+            <p:ph type="hdr" sz="quarter"/>
+          </p:nvPr>
+        </p:nvSpPr>
+        <p:spPr>
+          <a:xfrm>
+            <a:off x="0" y="0"/>
+            <a:ext cx="2971800" cy="458788"/>
+          </a:xfrm>
+          <a:prstGeom prst="rect">
+            <a:avLst/>
+          </a:prstGeom>
+        </p:spPr>
+        <p:txBody>
+          <a:bodyPr vert="horz" lIns="91440" tIns="45720" rIns="91440" bIns="45720" rtlCol="0"/>
+          <a:lstStyle>
+            <a:lvl1pPr algn="l">
+              <a:defRPr sz="1200"/>
+            </a:lvl1pPr>
+          </a:lstStyle>
+          <a:p>
+            <a:endParaRPr lang="nl-BE"/>
+          </a:p>
+        </p:txBody>
+      </p:sp>
+      <p:sp>
+        <p:nvSpPr>
+          <p:cNvPr id="3" name="Tijdelijke aanduiding voor datum 2"/>
+          <p:cNvSpPr>
+            <a:spLocks noGrp="1"/>
+          </p:cNvSpPr>
+          <p:nvPr>
+            <p:ph type="dt" idx="1"/>
+          </p:nvPr>
+        </p:nvSpPr>
+        <p:spPr>
+          <a:xfrm>
+            <a:off x="3884613" y="0"/>
+            <a:ext cx="2971800" cy="458788"/>
+          </a:xfrm>
+          <a:prstGeom prst="rect">
+            <a:avLst/>
+          </a:prstGeom>
+        </p:spPr>
+        <p:txBody>
+          <a:bodyPr vert="horz" lIns="91440" tIns="45720" rIns="91440" bIns="45720" rtlCol="0"/>
+          <a:lstStyle>
+            <a:lvl1pPr algn="r">
+              <a:defRPr sz="1200"/>
+            </a:lvl1pPr>
+          </a:lstStyle>
+          <a:p>
+            <a:fld id="{F6354610-5A04-46DC-AEC0-77794A3863B4}" type="datetimeFigureOut">
+              <a:rPr lang="nl-BE" smtClean="0"/>
+              <a:t>9/11/2016</a:t>
+            </a:fld>
+            <a:endParaRPr lang="nl-BE"/>
+          </a:p>
+        </p:txBody>
+      </p:sp>
+      <p:sp>
+        <p:nvSpPr>
+          <p:cNvPr id="4" name="Tijdelijke aanduiding voor dia-afbeelding 3"/>
+          <p:cNvSpPr>
+            <a:spLocks noGrp="1" noRot="1" noChangeAspect="1"/>
+          </p:cNvSpPr>
+          <p:nvPr>
+            <p:ph type="sldImg" idx="2"/>
+          </p:nvPr>
+        </p:nvSpPr>
+        <p:spPr>
+          <a:xfrm>
+            <a:off x="685800" y="1143000"/>
+            <a:ext cx="5486400" cy="3086100"/>
+          </a:xfrm>
+          <a:prstGeom prst="rect">
+            <a:avLst/>
+          </a:prstGeom>
+          <a:noFill/>
+          <a:ln w="12700">
+            <a:solidFill>
+              <a:prstClr val="black"/>
+            </a:solidFill>
+          </a:ln>
+        </p:spPr>
+        <p:txBody>
+          <a:bodyPr vert="horz" lIns="91440" tIns="45720" rIns="91440" bIns="45720" rtlCol="0" anchor="ctr"/>
+          <a:lstStyle/>
+          <a:p>
+            <a:endParaRPr lang="nl-BE"/>
+          </a:p>
+        </p:txBody>
+      </p:sp>
+      <p:sp>
+        <p:nvSpPr>
+          <p:cNvPr id="5" name="Tijdelijke aanduiding voor notities 4"/>
+          <p:cNvSpPr>
+            <a:spLocks noGrp="1"/>
+          </p:cNvSpPr>
+          <p:nvPr>
+            <p:ph type="body" sz="quarter" idx="3"/>
+          </p:nvPr>
+        </p:nvSpPr>
+        <p:spPr>
+          <a:xfrm>
+            <a:off x="685800" y="4400550"/>
+            <a:ext cx="5486400" cy="3600450"/>
+          </a:xfrm>
+          <a:prstGeom prst="rect">
+            <a:avLst/>
+          </a:prstGeom>
+        </p:spPr>
+        <p:txBody>
+          <a:bodyPr vert="horz" lIns="91440" tIns="45720" rIns="91440" bIns="45720" rtlCol="0"/>
+          <a:lstStyle/>
+          <a:p>
+            <a:pPr lvl="0"/>
+            <a:r>
+              <a:rPr lang="nl-NL"/>
+              <a:t>Tekststijl van het model bewerken</a:t>
+            </a:r>
+          </a:p>
+          <a:p>
+            <a:pPr lvl="1"/>
+            <a:r>
+              <a:rPr lang="nl-NL"/>
+              <a:t>Tweede niveau</a:t>
+            </a:r>
+          </a:p>
+          <a:p>
+            <a:pPr lvl="2"/>
+            <a:r>
+              <a:rPr lang="nl-NL"/>
+              <a:t>Derde niveau</a:t>
+            </a:r>
+          </a:p>
+          <a:p>
+            <a:pPr lvl="3"/>
+            <a:r>
+              <a:rPr lang="nl-NL"/>
+              <a:t>Vierde niveau</a:t>
+            </a:r>
+          </a:p>
+          <a:p>
+            <a:pPr lvl="4"/>
+            <a:r>
+              <a:rPr lang="nl-NL"/>
+              <a:t>Vijfde niveau</a:t>
+            </a:r>
+            <a:endParaRPr lang="nl-BE"/>
+          </a:p>
+        </p:txBody>
+      </p:sp>
+      <p:sp>
+        <p:nvSpPr>
+          <p:cNvPr id="6" name="Tijdelijke aanduiding voor voettekst 5"/>
+          <p:cNvSpPr>
+            <a:spLocks noGrp="1"/>
+          </p:cNvSpPr>
+          <p:nvPr>
+            <p:ph type="ftr" sz="quarter" idx="4"/>
+          </p:nvPr>
+        </p:nvSpPr>
+        <p:spPr>
+          <a:xfrm>
+            <a:off x="0" y="8685213"/>
+            <a:ext cx="2971800" cy="458787"/>
+          </a:xfrm>
+          <a:prstGeom prst="rect">
+            <a:avLst/>
+          </a:prstGeom>
+        </p:spPr>
+        <p:txBody>
+          <a:bodyPr vert="horz" lIns="91440" tIns="45720" rIns="91440" bIns="45720" rtlCol="0" anchor="b"/>
+          <a:lstStyle>
+            <a:lvl1pPr algn="l">
+              <a:defRPr sz="1200"/>
+            </a:lvl1pPr>
+          </a:lstStyle>
+          <a:p>
+            <a:endParaRPr lang="nl-BE"/>
+          </a:p>
+        </p:txBody>
+      </p:sp>
+      <p:sp>
+        <p:nvSpPr>
+          <p:cNvPr id="7" name="Tijdelijke aanduiding voor dianummer 6"/>
+          <p:cNvSpPr>
+            <a:spLocks noGrp="1"/>
+          </p:cNvSpPr>
+          <p:nvPr>
+            <p:ph type="sldNum" sz="quarter" idx="5"/>
+          </p:nvPr>
+        </p:nvSpPr>
+        <p:spPr>
+          <a:xfrm>
+            <a:off x="3884613" y="8685213"/>
+            <a:ext cx="2971800" cy="458787"/>
+          </a:xfrm>
+          <a:prstGeom prst="rect">
+            <a:avLst/>
+          </a:prstGeom>
+        </p:spPr>
+        <p:txBody>
+          <a:bodyPr vert="horz" lIns="91440" tIns="45720" rIns="91440" bIns="45720" rtlCol="0" anchor="b"/>
+          <a:lstStyle>
+            <a:lvl1pPr algn="r">
+              <a:defRPr sz="1200"/>
+            </a:lvl1pPr>
+          </a:lstStyle>
+          <a:p>
+            <a:fld id="{AF135C47-0969-479D-89CD-7486610A3D8E}" type="slidenum">
+              <a:rPr lang="nl-BE" smtClean="0"/>
+              <a:t>‹nr.›</a:t>
+            </a:fld>
+            <a:endParaRPr lang="nl-BE"/>
+          </a:p>
+        </p:txBody>
+      </p:sp>
+    </p:spTree>
+    <p:extLst>
+      <p:ext uri="{BB962C8B-B14F-4D97-AF65-F5344CB8AC3E}">
+        <p14:creationId xmlns:p14="http://schemas.microsoft.com/office/powerpoint/2010/main" val="3768344336"/>
+      </p:ext>
+    </p:extLst>
+  </p:cSld>
+  <p:clrMap bg1="lt1" tx1="dk1" bg2="lt2" tx2="dk2" accent1="accent1" accent2="accent2" accent3="accent3" accent4="accent4" accent5="accent5" accent6="accent6" hlink="hlink" folHlink="folHlink"/>
+  <p:notesStyle>
+    <a:lvl1pPr marL="0" algn="l" defTabSz="914400" rtl="0" eaLnBrk="1" latinLnBrk="0" hangingPunct="1">
+      <a:defRPr sz="1200" kern="1200">
+        <a:solidFill>
+          <a:schemeClr val="tx1"/>
+        </a:solidFill>
+        <a:latin typeface="+mn-lt"/>
+        <a:ea typeface="+mn-ea"/>
+        <a:cs typeface="+mn-cs"/>
+      </a:defRPr>
+    </a:lvl1pPr>
+    <a:lvl2pPr marL="457200" algn="l" defTabSz="914400" rtl="0" eaLnBrk="1" latinLnBrk="0" hangingPunct="1">
+      <a:defRPr sz="1200" kern="1200">
+        <a:solidFill>
+          <a:schemeClr val="tx1"/>
+        </a:solidFill>
+        <a:latin typeface="+mn-lt"/>
+        <a:ea typeface="+mn-ea"/>
+        <a:cs typeface="+mn-cs"/>
+      </a:defRPr>
+    </a:lvl2pPr>
+    <a:lvl3pPr marL="914400" algn="l" defTabSz="914400" rtl="0" eaLnBrk="1" latinLnBrk="0" hangingPunct="1">
+      <a:defRPr sz="1200" kern="1200">
+        <a:solidFill>
+          <a:schemeClr val="tx1"/>
+        </a:solidFill>
+        <a:latin typeface="+mn-lt"/>
+        <a:ea typeface="+mn-ea"/>
+        <a:cs typeface="+mn-cs"/>
+      </a:defRPr>
+    </a:lvl3pPr>
+    <a:lvl4pPr marL="1371600" algn="l" defTabSz="914400" rtl="0" eaLnBrk="1" latinLnBrk="0" hangingPunct="1">
+      <a:defRPr sz="1200" kern="1200">
+        <a:solidFill>
+          <a:schemeClr val="tx1"/>
+        </a:solidFill>
+        <a:latin typeface="+mn-lt"/>
+        <a:ea typeface="+mn-ea"/>
+        <a:cs typeface="+mn-cs"/>
+      </a:defRPr>
+    </a:lvl4pPr>
+    <a:lvl5pPr marL="1828800" algn="l" defTabSz="914400" rtl="0" eaLnBrk="1" latinLnBrk="0" hangingPunct="1">
+      <a:defRPr sz="1200" kern="1200">
+        <a:solidFill>
+          <a:schemeClr val="tx1"/>
+        </a:solidFill>
+        <a:latin typeface="+mn-lt"/>
+        <a:ea typeface="+mn-ea"/>
+        <a:cs typeface="+mn-cs"/>
+      </a:defRPr>
+    </a:lvl5pPr>
+    <a:lvl6pPr marL="2286000" algn="l" defTabSz="914400" rtl="0" eaLnBrk="1" latinLnBrk="0" hangingPunct="1">
+      <a:defRPr sz="1200" kern="1200">
+        <a:solidFill>
+          <a:schemeClr val="tx1"/>
+        </a:solidFill>
+        <a:latin typeface="+mn-lt"/>
+        <a:ea typeface="+mn-ea"/>
+        <a:cs typeface="+mn-cs"/>
+      </a:defRPr>
+    </a:lvl6pPr>
+    <a:lvl7pPr marL="2743200" algn="l" defTabSz="914400" rtl="0" eaLnBrk="1" latinLnBrk="0" hangingPunct="1">
+      <a:defRPr sz="1200" kern="1200">
+        <a:solidFill>
+          <a:schemeClr val="tx1"/>
+        </a:solidFill>
+        <a:latin typeface="+mn-lt"/>
+        <a:ea typeface="+mn-ea"/>
+        <a:cs typeface="+mn-cs"/>
+      </a:defRPr>
+    </a:lvl7pPr>
+    <a:lvl8pPr marL="3200400" algn="l" defTabSz="914400" rtl="0" eaLnBrk="1" latinLnBrk="0" hangingPunct="1">
+      <a:defRPr sz="1200" kern="1200">
+        <a:solidFill>
+          <a:schemeClr val="tx1"/>
+        </a:solidFill>
+        <a:latin typeface="+mn-lt"/>
+        <a:ea typeface="+mn-ea"/>
+        <a:cs typeface="+mn-cs"/>
+      </a:defRPr>
+    </a:lvl8pPr>
+    <a:lvl9pPr marL="3657600" algn="l" defTabSz="914400" rtl="0" eaLnBrk="1" latinLnBrk="0" hangingPunct="1">
+      <a:defRPr sz="1200" kern="1200">
+        <a:solidFill>
+          <a:schemeClr val="tx1"/>
+        </a:solidFill>
+        <a:latin typeface="+mn-lt"/>
+        <a:ea typeface="+mn-ea"/>
+        <a:cs typeface="+mn-cs"/>
+      </a:defRPr>
+    </a:lvl9pPr>
+  </p:notesStyle>
+</p:notesMaster>
+</file>
+
+<file path=ppt/notesSlides/notesSlide1.xml><?xml version="1.0" encoding="utf-8"?>
+<p:notes xmlns:a="http://schemas.openxmlformats.org/drawingml/2006/main" xmlns:r="http://schemas.openxmlformats.org/officeDocument/2006/relationships" xmlns:p="http://schemas.openxmlformats.org/presentationml/2006/main">
+  <p:cSld>
+    <p:spTree>
+      <p:nvGrpSpPr>
+        <p:cNvPr id="1" name=""/>
+        <p:cNvGrpSpPr/>
+        <p:nvPr/>
+      </p:nvGrpSpPr>
+      <p:grpSpPr>
+        <a:xfrm>
+          <a:off x="0" y="0"/>
+          <a:ext cx="0" cy="0"/>
+          <a:chOff x="0" y="0"/>
+          <a:chExt cx="0" cy="0"/>
+        </a:xfrm>
+      </p:grpSpPr>
+      <p:sp>
+        <p:nvSpPr>
+          <p:cNvPr id="2" name="Tijdelijke aanduiding voor dia-afbeelding 1"/>
+          <p:cNvSpPr>
+            <a:spLocks noGrp="1" noRot="1" noChangeAspect="1"/>
+          </p:cNvSpPr>
+          <p:nvPr>
+            <p:ph type="sldImg"/>
+          </p:nvPr>
+        </p:nvSpPr>
+        <p:spPr/>
+      </p:sp>
+      <p:sp>
+        <p:nvSpPr>
+          <p:cNvPr id="3" name="Tijdelijke aanduiding voor notities 2"/>
+          <p:cNvSpPr>
+            <a:spLocks noGrp="1"/>
+          </p:cNvSpPr>
+          <p:nvPr>
+            <p:ph type="body" idx="1"/>
+          </p:nvPr>
+        </p:nvSpPr>
+        <p:spPr/>
+        <p:txBody>
+          <a:bodyPr/>
+          <a:lstStyle/>
+          <a:p>
+            <a:r>
+              <a:rPr lang="nl-BE" dirty="0"/>
+              <a:t>Speech</a:t>
+            </a:r>
+            <a:r>
+              <a:rPr lang="nl-BE" baseline="0" dirty="0"/>
+              <a:t> </a:t>
+            </a:r>
+            <a:r>
+              <a:rPr lang="nl-BE" baseline="0" dirty="0" err="1"/>
+              <a:t>to</a:t>
+            </a:r>
+            <a:r>
+              <a:rPr lang="nl-BE" baseline="0" dirty="0"/>
+              <a:t> </a:t>
+            </a:r>
+            <a:r>
+              <a:rPr lang="nl-BE" baseline="0" dirty="0" err="1"/>
+              <a:t>text</a:t>
+            </a:r>
+            <a:r>
+              <a:rPr lang="nl-BE" baseline="0" dirty="0"/>
+              <a:t> gebeurt met de google </a:t>
+            </a:r>
+            <a:r>
+              <a:rPr lang="nl-BE" baseline="0" dirty="0" err="1"/>
+              <a:t>api</a:t>
+            </a:r>
+            <a:r>
+              <a:rPr lang="nl-BE" baseline="0" dirty="0"/>
+              <a:t> voor </a:t>
+            </a:r>
+            <a:r>
+              <a:rPr lang="nl-BE" baseline="0" dirty="0" err="1"/>
+              <a:t>android</a:t>
+            </a:r>
+            <a:r>
+              <a:rPr lang="nl-BE" baseline="0" dirty="0"/>
+              <a:t> studio. Het neemt op wat je inspreekt en streamt dat naar de google servers, daar wordt de gesproken zin geconverteerd naar een string die dan in de </a:t>
+            </a:r>
+            <a:r>
+              <a:rPr lang="nl-BE" baseline="0" dirty="0" err="1"/>
+              <a:t>activity</a:t>
+            </a:r>
+            <a:r>
+              <a:rPr lang="nl-BE" baseline="0" dirty="0"/>
+              <a:t> wordt getoond.</a:t>
+            </a:r>
+          </a:p>
+          <a:p>
+            <a:r>
+              <a:rPr lang="nl-BE" baseline="0" dirty="0"/>
+              <a:t>De stem herkenning maakt gebruik van de systeemtaal van de smartphone, dus als je smartphone in het </a:t>
+            </a:r>
+            <a:r>
+              <a:rPr lang="nl-BE" baseline="0" dirty="0" err="1"/>
+              <a:t>engels</a:t>
+            </a:r>
+            <a:r>
+              <a:rPr lang="nl-BE" baseline="0" dirty="0"/>
+              <a:t> staat zal die bijvoorbeeld </a:t>
+            </a:r>
+            <a:r>
+              <a:rPr lang="nl-BE" baseline="0" dirty="0" err="1"/>
+              <a:t>nederlandse</a:t>
+            </a:r>
+            <a:r>
+              <a:rPr lang="nl-BE" baseline="0" dirty="0"/>
+              <a:t> woordjes verstaan</a:t>
+            </a:r>
+          </a:p>
+          <a:p>
+            <a:r>
+              <a:rPr lang="nl-BE" baseline="0" dirty="0"/>
+              <a:t>Dit was vrij simpel om toe te passen, in </a:t>
+            </a:r>
+            <a:r>
+              <a:rPr lang="nl-BE" baseline="0" dirty="0" err="1"/>
+              <a:t>android</a:t>
+            </a:r>
+            <a:r>
+              <a:rPr lang="nl-BE" baseline="0" dirty="0"/>
+              <a:t> studio</a:t>
+            </a:r>
+          </a:p>
+          <a:p>
+            <a:endParaRPr lang="nl-BE" baseline="0" dirty="0"/>
+          </a:p>
+          <a:p>
+            <a:r>
+              <a:rPr lang="nl-BE" baseline="0" dirty="0"/>
+              <a:t>Daarnaast maken we ook nog gebruik van MQTT.</a:t>
+            </a:r>
+          </a:p>
+          <a:p>
+            <a:r>
+              <a:rPr lang="nl-BE" baseline="0" dirty="0"/>
+              <a:t>We gebruiken de PAHO bibliotheek om zo gebruik te maken in </a:t>
+            </a:r>
+            <a:r>
+              <a:rPr lang="nl-BE" baseline="0" dirty="0" err="1"/>
+              <a:t>android</a:t>
+            </a:r>
+            <a:r>
+              <a:rPr lang="nl-BE" baseline="0" dirty="0"/>
+              <a:t> studio van MQTT. Er zijn ook nog andere bibliotheken voor MQTT toe te passen in </a:t>
+            </a:r>
+            <a:r>
+              <a:rPr lang="nl-BE" baseline="0" dirty="0" err="1"/>
+              <a:t>android</a:t>
+            </a:r>
+            <a:r>
+              <a:rPr lang="nl-BE" baseline="0" dirty="0"/>
+              <a:t> studio maar deze leek ons het beste.</a:t>
+            </a:r>
+          </a:p>
+          <a:p>
+            <a:r>
+              <a:rPr lang="nl-BE" dirty="0"/>
+              <a:t>Wat we nu allemaal doen met deze</a:t>
+            </a:r>
+            <a:r>
+              <a:rPr lang="nl-BE" baseline="0" dirty="0"/>
+              <a:t> bibliotheek is ten eerste een connectie maken met onze Cloud MQTT. Dit gebeurt allemaal in de achtergrond dus je moet je nooit terug opnieuw aanmelden. Ook als je WIFI even wegvalt hebben we ervoor gezorgd dat je terug </a:t>
+            </a:r>
+            <a:r>
+              <a:rPr lang="nl-BE" baseline="0" dirty="0" err="1"/>
+              <a:t>reconnect</a:t>
+            </a:r>
+            <a:r>
+              <a:rPr lang="nl-BE" baseline="0" dirty="0"/>
+              <a:t> wanneer je verbinding terug is. We laten dit op het scherm zien, de status of je </a:t>
+            </a:r>
+            <a:r>
+              <a:rPr lang="nl-BE" baseline="0" dirty="0" err="1"/>
+              <a:t>connected</a:t>
+            </a:r>
+            <a:r>
+              <a:rPr lang="nl-BE" baseline="0" dirty="0"/>
+              <a:t> bent of niet. Dit kan je hier zien: (Laat korte demo zien).</a:t>
+            </a:r>
+          </a:p>
+          <a:p>
+            <a:endParaRPr lang="nl-BE" baseline="0" dirty="0"/>
+          </a:p>
+          <a:p>
+            <a:r>
+              <a:rPr lang="nl-BE" baseline="0" dirty="0"/>
+              <a:t>Daarnaast moeten we natuurlijk ook </a:t>
+            </a:r>
+            <a:r>
+              <a:rPr lang="nl-BE" baseline="0" dirty="0" err="1"/>
+              <a:t>messages</a:t>
+            </a:r>
+            <a:r>
+              <a:rPr lang="nl-BE" baseline="0" dirty="0"/>
+              <a:t> kunnen sturen van de </a:t>
+            </a:r>
+            <a:r>
+              <a:rPr lang="nl-BE" baseline="0" dirty="0" err="1"/>
+              <a:t>android</a:t>
+            </a:r>
+            <a:r>
+              <a:rPr lang="nl-BE" baseline="0" dirty="0"/>
+              <a:t> app naar de </a:t>
+            </a:r>
+            <a:r>
+              <a:rPr lang="nl-BE" baseline="0" dirty="0" err="1"/>
+              <a:t>de</a:t>
+            </a:r>
+            <a:r>
+              <a:rPr lang="nl-BE" baseline="0" dirty="0"/>
+              <a:t> </a:t>
+            </a:r>
+            <a:r>
+              <a:rPr lang="nl-BE" baseline="0" dirty="0" err="1"/>
+              <a:t>cloud</a:t>
+            </a:r>
+            <a:r>
+              <a:rPr lang="nl-BE" baseline="0" dirty="0"/>
+              <a:t>. En de </a:t>
+            </a:r>
+            <a:r>
+              <a:rPr lang="nl-BE" baseline="0" dirty="0" err="1"/>
+              <a:t>message</a:t>
+            </a:r>
+            <a:r>
+              <a:rPr lang="nl-BE" baseline="0" dirty="0"/>
+              <a:t> die we willen sturen is natuurlijk hetgeen wat de gebruiker commandeert. We gaan dus de google speech </a:t>
+            </a:r>
+            <a:r>
+              <a:rPr lang="nl-BE" baseline="0" dirty="0" err="1"/>
+              <a:t>to</a:t>
+            </a:r>
+            <a:r>
+              <a:rPr lang="nl-BE" baseline="0" dirty="0"/>
+              <a:t> tekst </a:t>
+            </a:r>
+            <a:r>
+              <a:rPr lang="nl-BE" baseline="0" dirty="0" err="1"/>
+              <a:t>api</a:t>
+            </a:r>
+            <a:r>
+              <a:rPr lang="nl-BE" baseline="0" dirty="0"/>
+              <a:t> laten samenwerken met MQTT. Als gebruiker bijvoorbeeld zegt dat de keuken lichten aan moeten, dan filteren we de woorden ‘Keuken’ en ‘Aan’ uit deze zin, we gebruiken dus </a:t>
+            </a:r>
+            <a:r>
+              <a:rPr lang="nl-BE" baseline="0" dirty="0" err="1"/>
+              <a:t>keywords</a:t>
+            </a:r>
+            <a:r>
+              <a:rPr lang="nl-BE" baseline="0" dirty="0"/>
+              <a:t>, omdat dit minder kans heeft op falen dan een hele zin. Deze 2 </a:t>
+            </a:r>
+            <a:r>
+              <a:rPr lang="nl-BE" baseline="0" dirty="0" err="1"/>
+              <a:t>keywords</a:t>
+            </a:r>
+            <a:r>
+              <a:rPr lang="nl-BE" baseline="0" dirty="0"/>
+              <a:t> worden dan verstuurd naar de </a:t>
+            </a:r>
+            <a:r>
+              <a:rPr lang="nl-BE" baseline="0" dirty="0" err="1"/>
+              <a:t>cloud</a:t>
+            </a:r>
+            <a:r>
+              <a:rPr lang="nl-BE" baseline="0" dirty="0"/>
+              <a:t>, de plaats onder topic, de state onder </a:t>
+            </a:r>
+            <a:r>
+              <a:rPr lang="nl-BE" baseline="0" dirty="0" err="1"/>
+              <a:t>message</a:t>
+            </a:r>
+            <a:r>
+              <a:rPr lang="nl-BE" baseline="0" dirty="0"/>
+              <a:t> (Dus topic: keuken, </a:t>
+            </a:r>
+            <a:r>
+              <a:rPr lang="nl-BE" baseline="0" dirty="0" err="1"/>
+              <a:t>message</a:t>
+            </a:r>
+            <a:r>
+              <a:rPr lang="nl-BE" baseline="0" dirty="0"/>
+              <a:t> ‘aan’). Ook hebben we ervoor gezorgd dat als er een foute zin wordt gezegd, dat de </a:t>
+            </a:r>
+            <a:r>
+              <a:rPr lang="nl-BE" baseline="0" dirty="0" err="1"/>
+              <a:t>message</a:t>
+            </a:r>
+            <a:r>
+              <a:rPr lang="nl-BE" baseline="0" dirty="0"/>
+              <a:t> dan niet word gestuurd, om zo overlast op de </a:t>
+            </a:r>
+            <a:r>
+              <a:rPr lang="nl-BE" baseline="0" dirty="0" err="1"/>
+              <a:t>cloud</a:t>
+            </a:r>
+            <a:r>
+              <a:rPr lang="nl-BE" baseline="0" dirty="0"/>
+              <a:t> </a:t>
+            </a:r>
+            <a:r>
+              <a:rPr lang="nl-BE" baseline="0" dirty="0" err="1"/>
+              <a:t>tegentehouden</a:t>
+            </a:r>
+            <a:r>
+              <a:rPr lang="nl-BE" baseline="0" dirty="0"/>
+              <a:t>.</a:t>
+            </a:r>
+          </a:p>
+          <a:p>
+            <a:endParaRPr lang="nl-BE" baseline="0" dirty="0"/>
+          </a:p>
+          <a:p>
+            <a:r>
+              <a:rPr lang="nl-BE" baseline="0" dirty="0"/>
+              <a:t>We hebben ook nog </a:t>
+            </a:r>
+            <a:r>
+              <a:rPr lang="nl-BE" baseline="0" dirty="0" err="1"/>
+              <a:t>subscribe</a:t>
+            </a:r>
+            <a:r>
+              <a:rPr lang="nl-BE" baseline="0" dirty="0"/>
+              <a:t> toegevoegd aan de app. Dit is meer voor confirmatie, zodat we wel degelijk zeker zijn dat de lichten op die plaats aan is.</a:t>
+            </a:r>
+          </a:p>
+          <a:p>
+            <a:endParaRPr lang="nl-BE" baseline="0" dirty="0"/>
+          </a:p>
+          <a:p>
+            <a:endParaRPr lang="nl-BE" baseline="0" dirty="0"/>
+          </a:p>
+          <a:p>
+            <a:endParaRPr lang="nl-BE" baseline="0" dirty="0"/>
+          </a:p>
+          <a:p>
+            <a:endParaRPr lang="nl-BE" dirty="0"/>
+          </a:p>
+        </p:txBody>
+      </p:sp>
+      <p:sp>
+        <p:nvSpPr>
+          <p:cNvPr id="4" name="Tijdelijke aanduiding voor dianummer 3"/>
+          <p:cNvSpPr>
+            <a:spLocks noGrp="1"/>
+          </p:cNvSpPr>
+          <p:nvPr>
+            <p:ph type="sldNum" sz="quarter" idx="10"/>
+          </p:nvPr>
+        </p:nvSpPr>
+        <p:spPr/>
+        <p:txBody>
+          <a:bodyPr/>
+          <a:lstStyle/>
+          <a:p>
+            <a:fld id="{AF135C47-0969-479D-89CD-7486610A3D8E}" type="slidenum">
+              <a:rPr lang="nl-BE" smtClean="0"/>
+              <a:t>5</a:t>
+            </a:fld>
+            <a:endParaRPr lang="nl-BE"/>
+          </a:p>
+        </p:txBody>
+      </p:sp>
+    </p:spTree>
+    <p:extLst>
+      <p:ext uri="{BB962C8B-B14F-4D97-AF65-F5344CB8AC3E}">
+        <p14:creationId xmlns:p14="http://schemas.microsoft.com/office/powerpoint/2010/main" val="2657218791"/>
+      </p:ext>
+    </p:extLst>
+  </p:cSld>
+  <p:clrMapOvr>
+    <a:masterClrMapping/>
+  </p:clrMapOvr>
+</p:notes>
+</file>
+
 <file path=ppt/slideLayouts/slideLayout1.xml><?xml version="1.0" encoding="utf-8"?>
 <p:sldLayout xmlns:a="http://schemas.openxmlformats.org/drawingml/2006/main" xmlns:r="http://schemas.openxmlformats.org/officeDocument/2006/relationships" xmlns:p="http://schemas.openxmlformats.org/presentationml/2006/main" type="title" preserve="1">
   <p:cSld name="Titeldia">
@@ -247,7 +982,7 @@
           <a:p>
             <a:fld id="{447042FB-0FC4-4655-8574-DD6C98DEE57E}" type="datetimeFigureOut">
               <a:rPr lang="nl-NL" smtClean="0"/>
-              <a:t>8-11-2016</a:t>
+              <a:t>9-11-2016</a:t>
             </a:fld>
             <a:endParaRPr lang="nl-NL"/>
           </a:p>
@@ -415,7 +1150,7 @@
           <a:p>
             <a:fld id="{447042FB-0FC4-4655-8574-DD6C98DEE57E}" type="datetimeFigureOut">
               <a:rPr lang="nl-NL" smtClean="0"/>
-              <a:t>8-11-2016</a:t>
+              <a:t>9-11-2016</a:t>
             </a:fld>
             <a:endParaRPr lang="nl-NL"/>
           </a:p>
@@ -593,7 +1328,7 @@
           <a:p>
             <a:fld id="{447042FB-0FC4-4655-8574-DD6C98DEE57E}" type="datetimeFigureOut">
               <a:rPr lang="nl-NL" smtClean="0"/>
-              <a:t>8-11-2016</a:t>
+              <a:t>9-11-2016</a:t>
             </a:fld>
             <a:endParaRPr lang="nl-NL"/>
           </a:p>
@@ -761,7 +1496,7 @@
           <a:p>
             <a:fld id="{447042FB-0FC4-4655-8574-DD6C98DEE57E}" type="datetimeFigureOut">
               <a:rPr lang="nl-NL" smtClean="0"/>
-              <a:t>8-11-2016</a:t>
+              <a:t>9-11-2016</a:t>
             </a:fld>
             <a:endParaRPr lang="nl-NL"/>
           </a:p>
@@ -1006,7 +1741,7 @@
           <a:p>
             <a:fld id="{447042FB-0FC4-4655-8574-DD6C98DEE57E}" type="datetimeFigureOut">
               <a:rPr lang="nl-NL" smtClean="0"/>
-              <a:t>8-11-2016</a:t>
+              <a:t>9-11-2016</a:t>
             </a:fld>
             <a:endParaRPr lang="nl-NL"/>
           </a:p>
@@ -1235,7 +1970,7 @@
           <a:p>
             <a:fld id="{447042FB-0FC4-4655-8574-DD6C98DEE57E}" type="datetimeFigureOut">
               <a:rPr lang="nl-NL" smtClean="0"/>
-              <a:t>8-11-2016</a:t>
+              <a:t>9-11-2016</a:t>
             </a:fld>
             <a:endParaRPr lang="nl-NL"/>
           </a:p>
@@ -1599,7 +2334,7 @@
           <a:p>
             <a:fld id="{447042FB-0FC4-4655-8574-DD6C98DEE57E}" type="datetimeFigureOut">
               <a:rPr lang="nl-NL" smtClean="0"/>
-              <a:t>8-11-2016</a:t>
+              <a:t>9-11-2016</a:t>
             </a:fld>
             <a:endParaRPr lang="nl-NL"/>
           </a:p>
@@ -1716,7 +2451,7 @@
           <a:p>
             <a:fld id="{447042FB-0FC4-4655-8574-DD6C98DEE57E}" type="datetimeFigureOut">
               <a:rPr lang="nl-NL" smtClean="0"/>
-              <a:t>8-11-2016</a:t>
+              <a:t>9-11-2016</a:t>
             </a:fld>
             <a:endParaRPr lang="nl-NL"/>
           </a:p>
@@ -1811,7 +2546,7 @@
           <a:p>
             <a:fld id="{447042FB-0FC4-4655-8574-DD6C98DEE57E}" type="datetimeFigureOut">
               <a:rPr lang="nl-NL" smtClean="0"/>
-              <a:t>8-11-2016</a:t>
+              <a:t>9-11-2016</a:t>
             </a:fld>
             <a:endParaRPr lang="nl-NL"/>
           </a:p>
@@ -2086,7 +2821,7 @@
           <a:p>
             <a:fld id="{447042FB-0FC4-4655-8574-DD6C98DEE57E}" type="datetimeFigureOut">
               <a:rPr lang="nl-NL" smtClean="0"/>
-              <a:t>8-11-2016</a:t>
+              <a:t>9-11-2016</a:t>
             </a:fld>
             <a:endParaRPr lang="nl-NL"/>
           </a:p>
@@ -2338,7 +3073,7 @@
           <a:p>
             <a:fld id="{447042FB-0FC4-4655-8574-DD6C98DEE57E}" type="datetimeFigureOut">
               <a:rPr lang="nl-NL" smtClean="0"/>
-              <a:t>8-11-2016</a:t>
+              <a:t>9-11-2016</a:t>
             </a:fld>
             <a:endParaRPr lang="nl-NL"/>
           </a:p>
@@ -2549,7 +3284,7 @@
           <a:p>
             <a:fld id="{447042FB-0FC4-4655-8574-DD6C98DEE57E}" type="datetimeFigureOut">
               <a:rPr lang="nl-NL" smtClean="0"/>
-              <a:t>8-11-2016</a:t>
+              <a:t>9-11-2016</a:t>
             </a:fld>
             <a:endParaRPr lang="nl-NL"/>
           </a:p>
@@ -3352,7 +4087,7 @@
             </a:r>
             <a:r>
               <a:rPr lang="nl-NL" dirty="0"/>
-              <a:t> Software</a:t>
+              <a:t> Hardware</a:t>
             </a:r>
           </a:p>
         </p:txBody>
@@ -3379,7 +4114,7 @@
     </p:spTree>
     <p:extLst>
       <p:ext uri="{BB962C8B-B14F-4D97-AF65-F5344CB8AC3E}">
-        <p14:creationId xmlns:p14="http://schemas.microsoft.com/office/powerpoint/2010/main" val="1762662383"/>
+        <p14:creationId xmlns:p14="http://schemas.microsoft.com/office/powerpoint/2010/main" val="2975633478"/>
       </p:ext>
     </p:extLst>
   </p:cSld>
@@ -3427,7 +4162,7 @@
             </a:r>
             <a:r>
               <a:rPr lang="nl-NL" dirty="0"/>
-              <a:t> Hardware</a:t>
+              <a:t> Software</a:t>
             </a:r>
           </a:p>
         </p:txBody>
@@ -3447,14 +4182,48 @@
           <a:bodyPr/>
           <a:lstStyle/>
           <a:p>
-            <a:endParaRPr lang="nl-NL"/>
+            <a:r>
+              <a:rPr lang="nl-BE" dirty="0"/>
+              <a:t>Android app</a:t>
+            </a:r>
+          </a:p>
+          <a:p>
+            <a:r>
+              <a:rPr lang="nl-BE" dirty="0"/>
+              <a:t>Speech </a:t>
+            </a:r>
+            <a:r>
+              <a:rPr lang="nl-BE" dirty="0" err="1"/>
+              <a:t>to</a:t>
+            </a:r>
+            <a:r>
+              <a:rPr lang="nl-BE" dirty="0"/>
+              <a:t> </a:t>
+            </a:r>
+            <a:r>
+              <a:rPr lang="nl-BE" dirty="0" err="1"/>
+              <a:t>text</a:t>
+            </a:r>
+            <a:endParaRPr lang="nl-BE" dirty="0"/>
+          </a:p>
+          <a:p>
+            <a:r>
+              <a:rPr lang="nl-BE" dirty="0"/>
+              <a:t>PAHO Android MQTT</a:t>
+            </a:r>
+          </a:p>
+          <a:p>
+            <a:pPr marL="0" indent="0">
+              <a:buNone/>
+            </a:pPr>
+            <a:endParaRPr lang="nl-NL" dirty="0"/>
           </a:p>
         </p:txBody>
       </p:sp>
     </p:spTree>
     <p:extLst>
       <p:ext uri="{BB962C8B-B14F-4D97-AF65-F5344CB8AC3E}">
-        <p14:creationId xmlns:p14="http://schemas.microsoft.com/office/powerpoint/2010/main" val="2975633478"/>
+        <p14:creationId xmlns:p14="http://schemas.microsoft.com/office/powerpoint/2010/main" val="1762662383"/>
       </p:ext>
     </p:extLst>
   </p:cSld>
@@ -3908,4 +4677,299 @@
     </a:ext>
   </a:extLst>
 </a:theme>
+</file>
+
+<file path=ppt/theme/theme2.xml><?xml version="1.0" encoding="utf-8"?>
+<a:theme xmlns:a="http://schemas.openxmlformats.org/drawingml/2006/main" name="Kantoorthema">
+  <a:themeElements>
+    <a:clrScheme name="Kantoor">
+      <a:dk1>
+        <a:sysClr val="windowText" lastClr="000000"/>
+      </a:dk1>
+      <a:lt1>
+        <a:sysClr val="window" lastClr="FFFFFF"/>
+      </a:lt1>
+      <a:dk2>
+        <a:srgbClr val="44546A"/>
+      </a:dk2>
+      <a:lt2>
+        <a:srgbClr val="E7E6E6"/>
+      </a:lt2>
+      <a:accent1>
+        <a:srgbClr val="5B9BD5"/>
+      </a:accent1>
+      <a:accent2>
+        <a:srgbClr val="ED7D31"/>
+      </a:accent2>
+      <a:accent3>
+        <a:srgbClr val="A5A5A5"/>
+      </a:accent3>
+      <a:accent4>
+        <a:srgbClr val="FFC000"/>
+      </a:accent4>
+      <a:accent5>
+        <a:srgbClr val="4472C4"/>
+      </a:accent5>
+      <a:accent6>
+        <a:srgbClr val="70AD47"/>
+      </a:accent6>
+      <a:hlink>
+        <a:srgbClr val="0563C1"/>
+      </a:hlink>
+      <a:folHlink>
+        <a:srgbClr val="954F72"/>
+      </a:folHlink>
+    </a:clrScheme>
+    <a:fontScheme name="Kantoor">
+      <a:majorFont>
+        <a:latin typeface="Calibri Light" panose="020F0302020204030204"/>
+        <a:ea typeface=""/>
+        <a:cs typeface=""/>
+        <a:font script="Jpan" typeface="游ゴシック Light"/>
+        <a:font script="Hang" typeface="맑은 고딕"/>
+        <a:font script="Hans" typeface="等线 Light"/>
+        <a:font script="Hant" typeface="新細明體"/>
+        <a:font script="Arab" typeface="Times New Roman"/>
+        <a:font script="Hebr" typeface="Times New Roman"/>
+        <a:font script="Thai" typeface="Angsana New"/>
+        <a:font script="Ethi" typeface="Nyala"/>
+        <a:font script="Beng" typeface="Vrinda"/>
+        <a:font script="Gujr" typeface="Shruti"/>
+        <a:font script="Khmr" typeface="MoolBoran"/>
+        <a:font script="Knda" typeface="Tunga"/>
+        <a:font script="Guru" typeface="Raavi"/>
+        <a:font script="Cans" typeface="Euphemia"/>
+        <a:font script="Cher" typeface="Plantagenet Cherokee"/>
+        <a:font script="Yiii" typeface="Microsoft Yi Baiti"/>
+        <a:font script="Tibt" typeface="Microsoft Himalaya"/>
+        <a:font script="Thaa" typeface="MV Boli"/>
+        <a:font script="Deva" typeface="Mangal"/>
+        <a:font script="Telu" typeface="Gautami"/>
+        <a:font script="Taml" typeface="Latha"/>
+        <a:font script="Syrc" typeface="Estrangelo Edessa"/>
+        <a:font script="Orya" typeface="Kalinga"/>
+        <a:font script="Mlym" typeface="Kartika"/>
+        <a:font script="Laoo" typeface="DokChampa"/>
+        <a:font script="Sinh" typeface="Iskoola Pota"/>
+        <a:font script="Mong" typeface="Mongolian Baiti"/>
+        <a:font script="Viet" typeface="Times New Roman"/>
+        <a:font script="Uigh" typeface="Microsoft Uighur"/>
+        <a:font script="Geor" typeface="Sylfaen"/>
+        <a:font script="Armn" typeface="Arial"/>
+        <a:font script="Bugi" typeface="Leelawadee UI"/>
+        <a:font script="Bopo" typeface="Microsoft JhengHei"/>
+        <a:font script="Java" typeface="Javanese Text"/>
+        <a:font script="Lisu" typeface="Segoe UI"/>
+        <a:font script="Mymr" typeface="Myanmar Text"/>
+        <a:font script="Nkoo" typeface="Ebrima"/>
+        <a:font script="Olck" typeface="Nirmala UI"/>
+        <a:font script="Osma" typeface="Ebrima"/>
+        <a:font script="Phag" typeface="Phagspa"/>
+        <a:font script="Syrn" typeface="Estrangelo Edessa"/>
+        <a:font script="Syrj" typeface="Estrangelo Edessa"/>
+        <a:font script="Syre" typeface="Estrangelo Edessa"/>
+        <a:font script="Sora" typeface="Nirmala UI"/>
+        <a:font script="Tale" typeface="Microsoft Tai Le"/>
+        <a:font script="Talu" typeface="Microsoft New Tai Lue"/>
+        <a:font script="Tfng" typeface="Ebrima"/>
+      </a:majorFont>
+      <a:minorFont>
+        <a:latin typeface="Calibri" panose="020F0502020204030204"/>
+        <a:ea typeface=""/>
+        <a:cs typeface=""/>
+        <a:font script="Jpan" typeface="游ゴシック"/>
+        <a:font script="Hang" typeface="맑은 고딕"/>
+        <a:font script="Hans" typeface="等线"/>
+        <a:font script="Hant" typeface="新細明體"/>
+        <a:font script="Arab" typeface="Arial"/>
+        <a:font script="Hebr" typeface="Arial"/>
+        <a:font script="Thai" typeface="Cordia New"/>
+        <a:font script="Ethi" typeface="Nyala"/>
+        <a:font script="Beng" typeface="Vrinda"/>
+        <a:font script="Gujr" typeface="Shruti"/>
+        <a:font script="Khmr" typeface="DaunPenh"/>
+        <a:font script="Knda" typeface="Tunga"/>
+        <a:font script="Guru" typeface="Raavi"/>
+        <a:font script="Cans" typeface="Euphemia"/>
+        <a:font script="Cher" typeface="Plantagenet Cherokee"/>
+        <a:font script="Yiii" typeface="Microsoft Yi Baiti"/>
+        <a:font script="Tibt" typeface="Microsoft Himalaya"/>
+        <a:font script="Thaa" typeface="MV Boli"/>
+        <a:font script="Deva" typeface="Mangal"/>
+        <a:font script="Telu" typeface="Gautami"/>
+        <a:font script="Taml" typeface="Latha"/>
+        <a:font script="Syrc" typeface="Estrangelo Edessa"/>
+        <a:font script="Orya" typeface="Kalinga"/>
+        <a:font script="Mlym" typeface="Kartika"/>
+        <a:font script="Laoo" typeface="DokChampa"/>
+        <a:font script="Sinh" typeface="Iskoola Pota"/>
+        <a:font script="Mong" typeface="Mongolian Baiti"/>
+        <a:font script="Viet" typeface="Arial"/>
+        <a:font script="Uigh" typeface="Microsoft Uighur"/>
+        <a:font script="Geor" typeface="Sylfaen"/>
+        <a:font script="Armn" typeface="Arial"/>
+        <a:font script="Bugi" typeface="Leelawadee UI"/>
+        <a:font script="Bopo" typeface="Microsoft JhengHei"/>
+        <a:font script="Java" typeface="Javanese Text"/>
+        <a:font script="Lisu" typeface="Segoe UI"/>
+        <a:font script="Mymr" typeface="Myanmar Text"/>
+        <a:font script="Nkoo" typeface="Ebrima"/>
+        <a:font script="Olck" typeface="Nirmala UI"/>
+        <a:font script="Osma" typeface="Ebrima"/>
+        <a:font script="Phag" typeface="Phagspa"/>
+        <a:font script="Syrn" typeface="Estrangelo Edessa"/>
+        <a:font script="Syrj" typeface="Estrangelo Edessa"/>
+        <a:font script="Syre" typeface="Estrangelo Edessa"/>
+        <a:font script="Sora" typeface="Nirmala UI"/>
+        <a:font script="Tale" typeface="Microsoft Tai Le"/>
+        <a:font script="Talu" typeface="Microsoft New Tai Lue"/>
+        <a:font script="Tfng" typeface="Ebrima"/>
+      </a:minorFont>
+    </a:fontScheme>
+    <a:fmtScheme name="Kantoor">
+      <a:fillStyleLst>
+        <a:solidFill>
+          <a:schemeClr val="phClr"/>
+        </a:solidFill>
+        <a:gradFill rotWithShape="1">
+          <a:gsLst>
+            <a:gs pos="0">
+              <a:schemeClr val="phClr">
+                <a:lumMod val="110000"/>
+                <a:satMod val="105000"/>
+                <a:tint val="67000"/>
+              </a:schemeClr>
+            </a:gs>
+            <a:gs pos="50000">
+              <a:schemeClr val="phClr">
+                <a:lumMod val="105000"/>
+                <a:satMod val="103000"/>
+                <a:tint val="73000"/>
+              </a:schemeClr>
+            </a:gs>
+            <a:gs pos="100000">
+              <a:schemeClr val="phClr">
+                <a:lumMod val="105000"/>
+                <a:satMod val="109000"/>
+                <a:tint val="81000"/>
+              </a:schemeClr>
+            </a:gs>
+          </a:gsLst>
+          <a:lin ang="5400000" scaled="0"/>
+        </a:gradFill>
+        <a:gradFill rotWithShape="1">
+          <a:gsLst>
+            <a:gs pos="0">
+              <a:schemeClr val="phClr">
+                <a:satMod val="103000"/>
+                <a:lumMod val="102000"/>
+                <a:tint val="94000"/>
+              </a:schemeClr>
+            </a:gs>
+            <a:gs pos="50000">
+              <a:schemeClr val="phClr">
+                <a:satMod val="110000"/>
+                <a:lumMod val="100000"/>
+                <a:shade val="100000"/>
+              </a:schemeClr>
+            </a:gs>
+            <a:gs pos="100000">
+              <a:schemeClr val="phClr">
+                <a:lumMod val="99000"/>
+                <a:satMod val="120000"/>
+                <a:shade val="78000"/>
+              </a:schemeClr>
+            </a:gs>
+          </a:gsLst>
+          <a:lin ang="5400000" scaled="0"/>
+        </a:gradFill>
+      </a:fillStyleLst>
+      <a:lnStyleLst>
+        <a:ln w="6350" cap="flat" cmpd="sng" algn="ctr">
+          <a:solidFill>
+            <a:schemeClr val="phClr"/>
+          </a:solidFill>
+          <a:prstDash val="solid"/>
+          <a:miter lim="800000"/>
+        </a:ln>
+        <a:ln w="12700" cap="flat" cmpd="sng" algn="ctr">
+          <a:solidFill>
+            <a:schemeClr val="phClr"/>
+          </a:solidFill>
+          <a:prstDash val="solid"/>
+          <a:miter lim="800000"/>
+        </a:ln>
+        <a:ln w="19050" cap="flat" cmpd="sng" algn="ctr">
+          <a:solidFill>
+            <a:schemeClr val="phClr"/>
+          </a:solidFill>
+          <a:prstDash val="solid"/>
+          <a:miter lim="800000"/>
+        </a:ln>
+      </a:lnStyleLst>
+      <a:effectStyleLst>
+        <a:effectStyle>
+          <a:effectLst/>
+        </a:effectStyle>
+        <a:effectStyle>
+          <a:effectLst/>
+        </a:effectStyle>
+        <a:effectStyle>
+          <a:effectLst>
+            <a:outerShdw blurRad="57150" dist="19050" dir="5400000" algn="ctr" rotWithShape="0">
+              <a:srgbClr val="000000">
+                <a:alpha val="63000"/>
+              </a:srgbClr>
+            </a:outerShdw>
+          </a:effectLst>
+        </a:effectStyle>
+      </a:effectStyleLst>
+      <a:bgFillStyleLst>
+        <a:solidFill>
+          <a:schemeClr val="phClr"/>
+        </a:solidFill>
+        <a:solidFill>
+          <a:schemeClr val="phClr">
+            <a:tint val="95000"/>
+            <a:satMod val="170000"/>
+          </a:schemeClr>
+        </a:solidFill>
+        <a:gradFill rotWithShape="1">
+          <a:gsLst>
+            <a:gs pos="0">
+              <a:schemeClr val="phClr">
+                <a:tint val="93000"/>
+                <a:satMod val="150000"/>
+                <a:shade val="98000"/>
+                <a:lumMod val="102000"/>
+              </a:schemeClr>
+            </a:gs>
+            <a:gs pos="50000">
+              <a:schemeClr val="phClr">
+                <a:tint val="98000"/>
+                <a:satMod val="130000"/>
+                <a:shade val="90000"/>
+                <a:lumMod val="103000"/>
+              </a:schemeClr>
+            </a:gs>
+            <a:gs pos="100000">
+              <a:schemeClr val="phClr">
+                <a:shade val="63000"/>
+                <a:satMod val="120000"/>
+              </a:schemeClr>
+            </a:gs>
+          </a:gsLst>
+          <a:lin ang="5400000" scaled="0"/>
+        </a:gradFill>
+      </a:bgFillStyleLst>
+    </a:fmtScheme>
+  </a:themeElements>
+  <a:objectDefaults/>
+  <a:extraClrSchemeLst/>
+  <a:extLst>
+    <a:ext uri="{05A4C25C-085E-4340-85A3-A5531E510DB2}">
+      <thm15:themeFamily xmlns:thm15="http://schemas.microsoft.com/office/thememl/2012/main" name="Office Theme" id="{62F939B6-93AF-4DB8-9C6B-D6C7DFDC589F}" vid="{4A3C46E8-61CC-4603-A589-7422A47A8E4A}"/>
+    </a:ext>
+  </a:extLst>
+</a:theme>
 </file>
</xml_diff>